<commit_message>
- completed the main papers
</commit_message>
<xml_diff>
--- a/CAD and System Schematics/Infographics and manuals/for data gathering.pptx
+++ b/CAD and System Schematics/Infographics and manuals/for data gathering.pptx
@@ -269,7 +269,7 @@
           <a:p>
             <a:fld id="{DBC1C7B0-1239-482F-AD19-B8FED225C2BC}" type="datetimeFigureOut">
               <a:rPr lang="en-PH" smtClean="0"/>
-              <a:t>23/04/2022</a:t>
+              <a:t>01/05/2022</a:t>
             </a:fld>
             <a:endParaRPr lang="en-PH"/>
           </a:p>
@@ -439,7 +439,7 @@
           <a:p>
             <a:fld id="{DBC1C7B0-1239-482F-AD19-B8FED225C2BC}" type="datetimeFigureOut">
               <a:rPr lang="en-PH" smtClean="0"/>
-              <a:t>23/04/2022</a:t>
+              <a:t>01/05/2022</a:t>
             </a:fld>
             <a:endParaRPr lang="en-PH"/>
           </a:p>
@@ -619,7 +619,7 @@
           <a:p>
             <a:fld id="{DBC1C7B0-1239-482F-AD19-B8FED225C2BC}" type="datetimeFigureOut">
               <a:rPr lang="en-PH" smtClean="0"/>
-              <a:t>23/04/2022</a:t>
+              <a:t>01/05/2022</a:t>
             </a:fld>
             <a:endParaRPr lang="en-PH"/>
           </a:p>
@@ -789,7 +789,7 @@
           <a:p>
             <a:fld id="{DBC1C7B0-1239-482F-AD19-B8FED225C2BC}" type="datetimeFigureOut">
               <a:rPr lang="en-PH" smtClean="0"/>
-              <a:t>23/04/2022</a:t>
+              <a:t>01/05/2022</a:t>
             </a:fld>
             <a:endParaRPr lang="en-PH"/>
           </a:p>
@@ -1033,7 +1033,7 @@
           <a:p>
             <a:fld id="{DBC1C7B0-1239-482F-AD19-B8FED225C2BC}" type="datetimeFigureOut">
               <a:rPr lang="en-PH" smtClean="0"/>
-              <a:t>23/04/2022</a:t>
+              <a:t>01/05/2022</a:t>
             </a:fld>
             <a:endParaRPr lang="en-PH"/>
           </a:p>
@@ -1265,7 +1265,7 @@
           <a:p>
             <a:fld id="{DBC1C7B0-1239-482F-AD19-B8FED225C2BC}" type="datetimeFigureOut">
               <a:rPr lang="en-PH" smtClean="0"/>
-              <a:t>23/04/2022</a:t>
+              <a:t>01/05/2022</a:t>
             </a:fld>
             <a:endParaRPr lang="en-PH"/>
           </a:p>
@@ -1632,7 +1632,7 @@
           <a:p>
             <a:fld id="{DBC1C7B0-1239-482F-AD19-B8FED225C2BC}" type="datetimeFigureOut">
               <a:rPr lang="en-PH" smtClean="0"/>
-              <a:t>23/04/2022</a:t>
+              <a:t>01/05/2022</a:t>
             </a:fld>
             <a:endParaRPr lang="en-PH"/>
           </a:p>
@@ -1750,7 +1750,7 @@
           <a:p>
             <a:fld id="{DBC1C7B0-1239-482F-AD19-B8FED225C2BC}" type="datetimeFigureOut">
               <a:rPr lang="en-PH" smtClean="0"/>
-              <a:t>23/04/2022</a:t>
+              <a:t>01/05/2022</a:t>
             </a:fld>
             <a:endParaRPr lang="en-PH"/>
           </a:p>
@@ -1845,7 +1845,7 @@
           <a:p>
             <a:fld id="{DBC1C7B0-1239-482F-AD19-B8FED225C2BC}" type="datetimeFigureOut">
               <a:rPr lang="en-PH" smtClean="0"/>
-              <a:t>23/04/2022</a:t>
+              <a:t>01/05/2022</a:t>
             </a:fld>
             <a:endParaRPr lang="en-PH"/>
           </a:p>
@@ -2122,7 +2122,7 @@
           <a:p>
             <a:fld id="{DBC1C7B0-1239-482F-AD19-B8FED225C2BC}" type="datetimeFigureOut">
               <a:rPr lang="en-PH" smtClean="0"/>
-              <a:t>23/04/2022</a:t>
+              <a:t>01/05/2022</a:t>
             </a:fld>
             <a:endParaRPr lang="en-PH"/>
           </a:p>
@@ -2379,7 +2379,7 @@
           <a:p>
             <a:fld id="{DBC1C7B0-1239-482F-AD19-B8FED225C2BC}" type="datetimeFigureOut">
               <a:rPr lang="en-PH" smtClean="0"/>
-              <a:t>23/04/2022</a:t>
+              <a:t>01/05/2022</a:t>
             </a:fld>
             <a:endParaRPr lang="en-PH"/>
           </a:p>
@@ -2592,7 +2592,7 @@
           <a:p>
             <a:fld id="{DBC1C7B0-1239-482F-AD19-B8FED225C2BC}" type="datetimeFigureOut">
               <a:rPr lang="en-PH" smtClean="0"/>
-              <a:t>23/04/2022</a:t>
+              <a:t>01/05/2022</a:t>
             </a:fld>
             <a:endParaRPr lang="en-PH"/>
           </a:p>
@@ -3414,8 +3414,8 @@
         </p:nvSpPr>
         <p:spPr>
           <a:xfrm>
-            <a:off x="2949096" y="989897"/>
-            <a:ext cx="3654398" cy="307777"/>
+            <a:off x="4422296" y="989897"/>
+            <a:ext cx="2208746" cy="307777"/>
           </a:xfrm>
           <a:prstGeom prst="rect">
             <a:avLst/>
@@ -3434,7 +3434,7 @@
                   <a:schemeClr val="bg1"/>
                 </a:solidFill>
               </a:rPr>
-              <a:t>Instructions &amp; User manual for Data Gathering</a:t>
+              <a:t>Instructions &amp; User manual</a:t>
             </a:r>
           </a:p>
         </p:txBody>

</xml_diff>